<commit_message>
Updated with additional examples
</commit_message>
<xml_diff>
--- a/The Unix Philosophy.pptx
+++ b/The Unix Philosophy.pptx
@@ -850,7 +850,7 @@
             <a:fld id="{B61BEF0D-F0BB-DE4B-95CE-6DB70DBA9567}" type="datetimeFigureOut">
               <a:rPr lang="en-US" dirty="0"/>
               <a:pPr/>
-              <a:t>8/26/2019</a:t>
+              <a:t>9/5/2019</a:t>
             </a:fld>
             <a:endParaRPr lang="en-US" dirty="0"/>
           </a:p>
@@ -1098,7 +1098,7 @@
             <a:fld id="{B61BEF0D-F0BB-DE4B-95CE-6DB70DBA9567}" type="datetimeFigureOut">
               <a:rPr lang="en-US" dirty="0"/>
               <a:pPr/>
-              <a:t>8/26/2019</a:t>
+              <a:t>9/5/2019</a:t>
             </a:fld>
             <a:endParaRPr lang="en-US" dirty="0"/>
           </a:p>
@@ -1409,7 +1409,7 @@
             <a:fld id="{B61BEF0D-F0BB-DE4B-95CE-6DB70DBA9567}" type="datetimeFigureOut">
               <a:rPr lang="en-US" dirty="0"/>
               <a:pPr/>
-              <a:t>8/26/2019</a:t>
+              <a:t>9/5/2019</a:t>
             </a:fld>
             <a:endParaRPr lang="en-US" dirty="0"/>
           </a:p>
@@ -1747,7 +1747,7 @@
             <a:fld id="{B61BEF0D-F0BB-DE4B-95CE-6DB70DBA9567}" type="datetimeFigureOut">
               <a:rPr lang="en-US" dirty="0"/>
               <a:pPr/>
-              <a:t>8/26/2019</a:t>
+              <a:t>9/5/2019</a:t>
             </a:fld>
             <a:endParaRPr lang="en-US" dirty="0"/>
           </a:p>
@@ -2058,7 +2058,7 @@
             <a:fld id="{B61BEF0D-F0BB-DE4B-95CE-6DB70DBA9567}" type="datetimeFigureOut">
               <a:rPr lang="en-US" dirty="0"/>
               <a:pPr/>
-              <a:t>8/26/2019</a:t>
+              <a:t>9/5/2019</a:t>
             </a:fld>
             <a:endParaRPr lang="en-US" dirty="0"/>
           </a:p>
@@ -2448,7 +2448,7 @@
             <a:fld id="{B61BEF0D-F0BB-DE4B-95CE-6DB70DBA9567}" type="datetimeFigureOut">
               <a:rPr lang="en-US" dirty="0"/>
               <a:pPr/>
-              <a:t>8/26/2019</a:t>
+              <a:t>9/5/2019</a:t>
             </a:fld>
             <a:endParaRPr lang="en-US" dirty="0"/>
           </a:p>
@@ -2614,7 +2614,7 @@
           <a:p>
             <a:fld id="{55C6B4A9-1611-4792-9094-5F34BCA07E0B}" type="datetimeFigureOut">
               <a:rPr lang="en-US" dirty="0"/>
-              <a:t>8/26/2019</a:t>
+              <a:t>9/5/2019</a:t>
             </a:fld>
             <a:endParaRPr lang="en-US" dirty="0"/>
           </a:p>
@@ -2790,7 +2790,7 @@
             <a:fld id="{B61BEF0D-F0BB-DE4B-95CE-6DB70DBA9567}" type="datetimeFigureOut">
               <a:rPr lang="en-US" dirty="0"/>
               <a:pPr/>
-              <a:t>8/26/2019</a:t>
+              <a:t>9/5/2019</a:t>
             </a:fld>
             <a:endParaRPr lang="en-US" dirty="0"/>
           </a:p>
@@ -2963,7 +2963,7 @@
             <a:fld id="{B61BEF0D-F0BB-DE4B-95CE-6DB70DBA9567}" type="datetimeFigureOut">
               <a:rPr lang="en-US" dirty="0"/>
               <a:pPr/>
-              <a:t>8/26/2019</a:t>
+              <a:t>9/5/2019</a:t>
             </a:fld>
             <a:endParaRPr lang="en-US" dirty="0"/>
           </a:p>
@@ -3207,7 +3207,7 @@
             <a:fld id="{B61BEF0D-F0BB-DE4B-95CE-6DB70DBA9567}" type="datetimeFigureOut">
               <a:rPr lang="en-US" dirty="0"/>
               <a:pPr/>
-              <a:t>8/26/2019</a:t>
+              <a:t>9/5/2019</a:t>
             </a:fld>
             <a:endParaRPr lang="en-US" dirty="0"/>
           </a:p>
@@ -3435,7 +3435,7 @@
           <a:p>
             <a:fld id="{EB712588-04B1-427B-82EE-E8DB90309F08}" type="datetimeFigureOut">
               <a:rPr lang="en-US" dirty="0"/>
-              <a:t>8/26/2019</a:t>
+              <a:t>9/5/2019</a:t>
             </a:fld>
             <a:endParaRPr lang="en-US" dirty="0"/>
           </a:p>
@@ -3805,7 +3805,7 @@
             <a:fld id="{B61BEF0D-F0BB-DE4B-95CE-6DB70DBA9567}" type="datetimeFigureOut">
               <a:rPr lang="en-US" dirty="0"/>
               <a:pPr/>
-              <a:t>8/26/2019</a:t>
+              <a:t>9/5/2019</a:t>
             </a:fld>
             <a:endParaRPr lang="en-US" dirty="0"/>
           </a:p>
@@ -3925,7 +3925,7 @@
             <a:fld id="{B61BEF0D-F0BB-DE4B-95CE-6DB70DBA9567}" type="datetimeFigureOut">
               <a:rPr lang="en-US" dirty="0"/>
               <a:pPr/>
-              <a:t>8/26/2019</a:t>
+              <a:t>9/5/2019</a:t>
             </a:fld>
             <a:endParaRPr lang="en-US" dirty="0"/>
           </a:p>
@@ -4017,7 +4017,7 @@
             <a:fld id="{B61BEF0D-F0BB-DE4B-95CE-6DB70DBA9567}" type="datetimeFigureOut">
               <a:rPr lang="en-US" dirty="0"/>
               <a:pPr/>
-              <a:t>8/26/2019</a:t>
+              <a:t>9/5/2019</a:t>
             </a:fld>
             <a:endParaRPr lang="en-US" dirty="0"/>
           </a:p>
@@ -4268,7 +4268,7 @@
           <a:p>
             <a:fld id="{42A54C80-263E-416B-A8E0-580EDEADCBDC}" type="datetimeFigureOut">
               <a:rPr lang="en-US" dirty="0"/>
-              <a:t>8/26/2019</a:t>
+              <a:t>9/5/2019</a:t>
             </a:fld>
             <a:endParaRPr lang="en-US" dirty="0"/>
           </a:p>
@@ -4527,7 +4527,7 @@
             <a:fld id="{B61BEF0D-F0BB-DE4B-95CE-6DB70DBA9567}" type="datetimeFigureOut">
               <a:rPr lang="en-US" dirty="0"/>
               <a:pPr/>
-              <a:t>8/26/2019</a:t>
+              <a:t>9/5/2019</a:t>
             </a:fld>
             <a:endParaRPr lang="en-US" dirty="0"/>
           </a:p>
@@ -5267,7 +5267,7 @@
             <a:fld id="{B61BEF0D-F0BB-DE4B-95CE-6DB70DBA9567}" type="datetimeFigureOut">
               <a:rPr lang="en-US" dirty="0"/>
               <a:pPr/>
-              <a:t>8/26/2019</a:t>
+              <a:t>9/5/2019</a:t>
             </a:fld>
             <a:endParaRPr lang="en-US" dirty="0"/>
           </a:p>
@@ -5994,8 +5994,13 @@
           <a:p>
             <a:r>
               <a:rPr lang="en-US" dirty="0"/>
-              <a:t>Scott McCrory – 8/26/2019</a:t>
-            </a:r>
+              <a:t>Scott McCrory </a:t>
+            </a:r>
+            <a:r>
+              <a:rPr lang="en-US"/>
+              <a:t>– 9/5/2019</a:t>
+            </a:r>
+            <a:endParaRPr lang="en-US" dirty="0"/>
           </a:p>
         </p:txBody>
       </p:sp>
@@ -6101,7 +6106,7 @@
         </p:spPr>
         <p:txBody>
           <a:bodyPr>
-            <a:normAutofit fontScale="92500" lnSpcReduction="10000"/>
+            <a:normAutofit fontScale="92500"/>
           </a:bodyPr>
           <a:lstStyle/>
           <a:p>
@@ -6123,7 +6128,7 @@
             </a:pPr>
             <a:r>
               <a:rPr lang="en-US" sz="2400" dirty="0"/>
-              <a:t>This is true of IaaS, PaaS and SaaS offerings too</a:t>
+              <a:t>The most efficient way is rarely portable; conversely increased portability overcomes the lack of speed</a:t>
             </a:r>
           </a:p>
           <a:p>
@@ -6134,7 +6139,7 @@
             </a:pPr>
             <a:r>
               <a:rPr lang="en-US" sz="2400" dirty="0"/>
-              <a:t>The most efficient way is rarely portable</a:t>
+              <a:t>Portable software also reduces the need for user training</a:t>
             </a:r>
           </a:p>
           <a:p>
@@ -6145,7 +6150,7 @@
             </a:pPr>
             <a:r>
               <a:rPr lang="en-US" sz="2400" dirty="0"/>
-              <a:t>Increased portability overcomes the lack of speed</a:t>
+              <a:t>Good programs never die – they’re just ported to new hardware platforms</a:t>
             </a:r>
           </a:p>
           <a:p>
@@ -6155,19 +6160,8 @@
               </a:lnSpc>
             </a:pPr>
             <a:r>
-              <a:rPr lang="en-US" sz="2400" dirty="0"/>
-              <a:t>Portable software also reduces the need for user training</a:t>
-            </a:r>
-          </a:p>
-          <a:p>
-            <a:pPr>
-              <a:lnSpc>
-                <a:spcPct val="90000"/>
-              </a:lnSpc>
-            </a:pPr>
-            <a:r>
-              <a:rPr lang="en-US" sz="2400" dirty="0"/>
-              <a:t>Good programs never die – they’re just ported to new hardware platforms</a:t>
+              <a:rPr lang="en-US" sz="2400" i="1" dirty="0"/>
+              <a:t>This is also true of competing IaaS, PaaS and SaaS offerings</a:t>
             </a:r>
           </a:p>
         </p:txBody>
@@ -6367,13 +6361,13 @@
         </p:nvSpPr>
         <p:spPr>
           <a:xfrm>
-            <a:off x="2849562" y="2160589"/>
-            <a:ext cx="6424440" cy="4503822"/>
+            <a:off x="2849561" y="2160589"/>
+            <a:ext cx="6864889" cy="4503822"/>
           </a:xfrm>
         </p:spPr>
         <p:txBody>
           <a:bodyPr>
-            <a:normAutofit fontScale="92500" lnSpcReduction="10000"/>
+            <a:normAutofit fontScale="92500"/>
           </a:bodyPr>
           <a:lstStyle/>
           <a:p>
@@ -6384,7 +6378,7 @@
             </a:pPr>
             <a:r>
               <a:rPr lang="en-US" sz="2400" b="1" dirty="0"/>
-              <a:t>Said more modernly, “Store data in portable, easy-to-leverage forms”</a:t>
+              <a:t>Said more generically, “Store data in portable, easy-to-leverage forms”</a:t>
             </a:r>
           </a:p>
           <a:p>
@@ -6395,7 +6389,7 @@
             </a:pPr>
             <a:r>
               <a:rPr lang="en-US" sz="2400" dirty="0"/>
-              <a:t>Useful data must go somewhere – bits that sit on disks forever help no one</a:t>
+              <a:t>Useful data must go somewhere – bits that sit on disks forever help nobody</a:t>
             </a:r>
           </a:p>
           <a:p>
@@ -6680,7 +6674,23 @@
                   <a:schemeClr val="tx1"/>
                 </a:solidFill>
               </a:rPr>
-              <a:t>Automate everything</a:t>
+              <a:t>Automate everything – </a:t>
+            </a:r>
+            <a:r>
+              <a:rPr lang="en-US" sz="2800" dirty="0" err="1">
+                <a:solidFill>
+                  <a:schemeClr val="tx1"/>
+                </a:solidFill>
+              </a:rPr>
+              <a:t>hellooo</a:t>
+            </a:r>
+            <a:r>
+              <a:rPr lang="en-US" sz="2800" dirty="0">
+                <a:solidFill>
+                  <a:schemeClr val="tx1"/>
+                </a:solidFill>
+              </a:rPr>
+              <a:t> DevOps, CI and CD</a:t>
             </a:r>
           </a:p>
           <a:p>
@@ -6721,8 +6731,8 @@
         </p:blipFill>
         <p:spPr bwMode="auto">
           <a:xfrm>
-            <a:off x="480815" y="1951727"/>
-            <a:ext cx="3176784" cy="3247473"/>
+            <a:off x="615039" y="2189528"/>
+            <a:ext cx="2656668" cy="2715784"/>
           </a:xfrm>
           <a:prstGeom prst="rect">
             <a:avLst/>
@@ -7139,13 +7149,7 @@
           <a:p>
             <a:r>
               <a:rPr lang="en-US" sz="2400" dirty="0"/>
-              <a:t>Shell scripts give you awesome leverage</a:t>
-            </a:r>
-          </a:p>
-          <a:p>
-            <a:r>
-              <a:rPr lang="en-US" sz="2400" dirty="0"/>
-              <a:t>Shell scripts are more portable than compiled opcode (like C)</a:t>
+              <a:t>“Shell scripts” provide awesome leverage and are more portable than compiled opcode</a:t>
             </a:r>
           </a:p>
           <a:p>
@@ -7157,7 +7161,7 @@
           <a:p>
             <a:r>
               <a:rPr lang="en-US" sz="2400" dirty="0"/>
-              <a:t>Perl’s and Python’s successes followed scripts because of this principle.  Puppet (Ruby) may follow the same path</a:t>
+              <a:t>Perl’s and Python’s successes followed scripts because of this principle.  Puppet, Ansible, PowerShell and others are following a similar path</a:t>
             </a:r>
           </a:p>
         </p:txBody>
@@ -7566,7 +7570,7 @@
                   <a:schemeClr val="tx1"/>
                 </a:solidFill>
               </a:rPr>
-              <a:t>In UNIX, streams are magic</a:t>
+              <a:t>In UNIX, streams and pipes are magic</a:t>
             </a:r>
           </a:p>
           <a:p>
@@ -7619,7 +7623,7 @@
                   <a:schemeClr val="tx1"/>
                 </a:solidFill>
               </a:rPr>
-              <a:t>Stderr for out-of-band information</a:t>
+              <a:t>Stderr for out-of-band output</a:t>
             </a:r>
           </a:p>
           <a:p>
@@ -7634,7 +7638,7 @@
                   <a:schemeClr val="tx1"/>
                 </a:solidFill>
               </a:rPr>
-              <a:t>In some ways, is Microservices’ Kafka the new Streams?</a:t>
+              <a:t>Other examples: Separate data collection and reporting components using MDM, EDW and Analytics tiers, ETL, AOP, security layers…</a:t>
             </a:r>
           </a:p>
           <a:p>
@@ -7680,7 +7684,7 @@
         </p:blipFill>
         <p:spPr bwMode="auto">
           <a:xfrm>
-            <a:off x="5764267" y="3630752"/>
+            <a:off x="6066271" y="3832088"/>
             <a:ext cx="3646588" cy="1075743"/>
           </a:xfrm>
           <a:prstGeom prst="rect">
@@ -7789,13 +7793,13 @@
         </p:nvSpPr>
         <p:spPr>
           <a:xfrm>
-            <a:off x="5209562" y="1515762"/>
-            <a:ext cx="4391609" cy="5165124"/>
+            <a:off x="5394960" y="1515762"/>
+            <a:ext cx="4420159" cy="5165124"/>
           </a:xfrm>
         </p:spPr>
         <p:txBody>
           <a:bodyPr>
-            <a:normAutofit/>
+            <a:normAutofit lnSpcReduction="10000"/>
           </a:bodyPr>
           <a:lstStyle/>
           <a:p>
@@ -7808,14 +7812,14 @@
             <a:pPr lvl="1"/>
             <a:r>
               <a:rPr lang="en-US" sz="2400" dirty="0"/>
-              <a:t>The UNIX Philosophy is just as relevant today as it was set forth in the 1970s, well-beyond operating system design</a:t>
+              <a:t>The UNIX Philosophy is just as relevant today as it was set forth in the 1970s and goes well-beyond OS design</a:t>
             </a:r>
           </a:p>
           <a:p>
             <a:pPr lvl="1"/>
             <a:r>
               <a:rPr lang="en-US" sz="2400" dirty="0"/>
-              <a:t>This is true of every part of I.T., not just software</a:t>
+              <a:t>Try to apply it to every part of I.T., not just software</a:t>
             </a:r>
           </a:p>
           <a:p>
@@ -8767,7 +8771,7 @@
             </a:pPr>
             <a:r>
               <a:rPr lang="en-US" sz="1800" dirty="0"/>
-              <a:t>And MANY more…</a:t>
+              <a:t>And MANY, MANY more…</a:t>
             </a:r>
           </a:p>
         </p:txBody>
@@ -9287,7 +9291,7 @@
         </p:spPr>
         <p:txBody>
           <a:bodyPr>
-            <a:normAutofit/>
+            <a:normAutofit fontScale="92500" lnSpcReduction="20000"/>
           </a:bodyPr>
           <a:lstStyle/>
           <a:p>
@@ -9337,7 +9341,17 @@
                   <a:schemeClr val="tx1"/>
                 </a:solidFill>
               </a:rPr>
-              <a:t>OOP classes, Microservices, server tiers, containers…</a:t>
+              <a:t>Examples: OOP classes, microservices, server tiers, containers…</a:t>
+            </a:r>
+          </a:p>
+          <a:p>
+            <a:r>
+              <a:rPr lang="en-US" sz="2800" dirty="0">
+                <a:solidFill>
+                  <a:schemeClr val="tx1"/>
+                </a:solidFill>
+              </a:rPr>
+              <a:t>Avoid monoliths</a:t>
             </a:r>
           </a:p>
           <a:p>
@@ -9683,7 +9697,7 @@
         </p:spPr>
         <p:txBody>
           <a:bodyPr>
-            <a:normAutofit fontScale="92500"/>
+            <a:normAutofit fontScale="92500" lnSpcReduction="10000"/>
           </a:bodyPr>
           <a:lstStyle/>
           <a:p>
@@ -9701,7 +9715,13 @@
           <a:p>
             <a:r>
               <a:rPr lang="en-US" sz="2400" dirty="0"/>
-              <a:t>Avoid creeping featurism</a:t>
+              <a:t>Do avoid creeping featurism</a:t>
+            </a:r>
+          </a:p>
+          <a:p>
+            <a:r>
+              <a:rPr lang="en-US" sz="2400" dirty="0"/>
+              <a:t>Do aspire to High Cohesion and Loose Decoupling</a:t>
             </a:r>
           </a:p>
           <a:p>
@@ -9713,7 +9733,7 @@
           <a:p>
             <a:r>
               <a:rPr lang="en-US" sz="2400" dirty="0"/>
-              <a:t>Aspire to High Cohesion and Loose Decoupling</a:t>
+              <a:t>Avoid monoliths (again)!</a:t>
             </a:r>
           </a:p>
         </p:txBody>
@@ -9932,7 +9952,7 @@
                   <a:srgbClr val="FFFFFF"/>
                 </a:solidFill>
               </a:rPr>
-              <a:t>Prototyping is a learning process</a:t>
+              <a:t>Think about prototyping as a learning process</a:t>
             </a:r>
           </a:p>
           <a:p>
@@ -9980,8 +10000,17 @@
                 <a:solidFill>
                   <a:srgbClr val="FFFFFF"/>
                 </a:solidFill>
+                <a:sym typeface="Wingdings" panose="05000000000000000000" pitchFamily="2" charset="2"/>
               </a:rPr>
-              <a:t>Let’s get the first two out of the way early </a:t>
+              <a:t>Budget for refactoring, then l</a:t>
+            </a:r>
+            <a:r>
+              <a:rPr lang="en-US" sz="2400" dirty="0">
+                <a:solidFill>
+                  <a:srgbClr val="FFFFFF"/>
+                </a:solidFill>
+              </a:rPr>
+              <a:t>et’s get the first two iterations out of the way early </a:t>
             </a:r>
             <a:r>
               <a:rPr lang="en-US" sz="2400" dirty="0">
@@ -9992,23 +10021,6 @@
               </a:rPr>
               <a:t></a:t>
             </a:r>
-          </a:p>
-          <a:p>
-            <a:pPr lvl="1"/>
-            <a:r>
-              <a:rPr lang="en-US" sz="2400" dirty="0">
-                <a:solidFill>
-                  <a:srgbClr val="FFFFFF"/>
-                </a:solidFill>
-                <a:sym typeface="Wingdings" panose="05000000000000000000" pitchFamily="2" charset="2"/>
-              </a:rPr>
-              <a:t>Budget for refactoring</a:t>
-            </a:r>
-            <a:endParaRPr lang="en-US" sz="2400" dirty="0">
-              <a:solidFill>
-                <a:srgbClr val="FFFFFF"/>
-              </a:solidFill>
-            </a:endParaRPr>
           </a:p>
         </p:txBody>
       </p:sp>
@@ -10289,6 +10301,15 @@
 </file>
 
 <file path=customXml/item2.xml><?xml version="1.0" encoding="utf-8"?>
+<?mso-contentType ?>
+<FormTemplates xmlns="http://schemas.microsoft.com/sharepoint/v3/contenttype/forms">
+  <Display>DocumentLibraryForm</Display>
+  <Edit>DocumentLibraryForm</Edit>
+  <New>DocumentLibraryForm</New>
+</FormTemplates>
+</file>
+
+<file path=customXml/item3.xml><?xml version="1.0" encoding="utf-8"?>
 <ct:contentTypeSchema xmlns:ct="http://schemas.microsoft.com/office/2006/metadata/contentType" xmlns:ma="http://schemas.microsoft.com/office/2006/metadata/properties/metaAttributes" ct:_="" ma:_="" ma:contentTypeName="Document" ma:contentTypeID="0x010100999C4FC1E27B604AB083C5A2EF450DFC" ma:contentTypeVersion="0" ma:contentTypeDescription="Create a new document." ma:contentTypeScope="" ma:versionID="33e62442aba9e8183c430b9529e05696">
   <xsd:schema xmlns:xsd="http://www.w3.org/2001/XMLSchema" xmlns:xs="http://www.w3.org/2001/XMLSchema" xmlns:p="http://schemas.microsoft.com/office/2006/metadata/properties" targetNamespace="http://schemas.microsoft.com/office/2006/metadata/properties" ma:root="true" ma:fieldsID="1b05d82d297216baf5b26c55225140df">
     <xsd:element name="properties">
@@ -10402,15 +10423,6 @@
 </ct:contentTypeSchema>
 </file>
 
-<file path=customXml/item3.xml><?xml version="1.0" encoding="utf-8"?>
-<?mso-contentType ?>
-<FormTemplates xmlns="http://schemas.microsoft.com/sharepoint/v3/contenttype/forms">
-  <Display>DocumentLibraryForm</Display>
-  <Edit>DocumentLibraryForm</Edit>
-  <New>DocumentLibraryForm</New>
-</FormTemplates>
-</file>
-
 <file path=customXml/itemProps1.xml><?xml version="1.0" encoding="utf-8"?>
 <ds:datastoreItem xmlns:ds="http://schemas.openxmlformats.org/officeDocument/2006/customXml" ds:itemID="{1216D02C-A6EB-45B3-A6B2-3D1DF222F307}">
   <ds:schemaRefs>
@@ -10427,6 +10439,14 @@
 </file>
 
 <file path=customXml/itemProps2.xml><?xml version="1.0" encoding="utf-8"?>
+<ds:datastoreItem xmlns:ds="http://schemas.openxmlformats.org/officeDocument/2006/customXml" ds:itemID="{F218C08F-A677-43C3-BF8E-C9EC5ECE9826}">
+  <ds:schemaRefs>
+    <ds:schemaRef ds:uri="http://schemas.microsoft.com/sharepoint/v3/contenttype/forms"/>
+  </ds:schemaRefs>
+</ds:datastoreItem>
+</file>
+
+<file path=customXml/itemProps3.xml><?xml version="1.0" encoding="utf-8"?>
 <ds:datastoreItem xmlns:ds="http://schemas.openxmlformats.org/officeDocument/2006/customXml" ds:itemID="{A8ED9177-9849-439D-B4A9-EBD14F4EE18D}">
   <ds:schemaRefs>
     <ds:schemaRef ds:uri="http://schemas.microsoft.com/office/2006/metadata/contentType"/>
@@ -10440,12 +10460,4 @@
     <ds:schemaRef ds:uri="http://schemas.microsoft.com/office/infopath/2007/PartnerControls"/>
   </ds:schemaRefs>
 </ds:datastoreItem>
-</file>
-
-<file path=customXml/itemProps3.xml><?xml version="1.0" encoding="utf-8"?>
-<ds:datastoreItem xmlns:ds="http://schemas.openxmlformats.org/officeDocument/2006/customXml" ds:itemID="{F218C08F-A677-43C3-BF8E-C9EC5ECE9826}">
-  <ds:schemaRefs>
-    <ds:schemaRef ds:uri="http://schemas.microsoft.com/sharepoint/v3/contenttype/forms"/>
-  </ds:schemaRefs>
-</ds:datastoreItem>
 </file>
</xml_diff>